<commit_message>
fix title on lesson7
</commit_message>
<xml_diff>
--- a/Slides/lesson7.pptx
+++ b/Slides/lesson7.pptx
@@ -314,7 +314,7 @@
           <a:p>
             <a:fld id="{5B4E9A02-2862-4C46-BDE8-5458F4D04D4E}" type="datetimeFigureOut">
               <a:rPr lang="en-US" smtClean="0"/>
-              <a:t>2/17/16</a:t>
+              <a:t>2/19/16</a:t>
             </a:fld>
             <a:endParaRPr lang="en-US"/>
           </a:p>
@@ -479,7 +479,7 @@
           <a:p>
             <a:fld id="{5B4E9A02-2862-4C46-BDE8-5458F4D04D4E}" type="datetimeFigureOut">
               <a:rPr lang="en-US" smtClean="0"/>
-              <a:t>2/17/16</a:t>
+              <a:t>2/19/16</a:t>
             </a:fld>
             <a:endParaRPr lang="en-US"/>
           </a:p>
@@ -654,7 +654,7 @@
           <a:p>
             <a:fld id="{5B4E9A02-2862-4C46-BDE8-5458F4D04D4E}" type="datetimeFigureOut">
               <a:rPr lang="en-US" smtClean="0"/>
-              <a:t>2/17/16</a:t>
+              <a:t>2/19/16</a:t>
             </a:fld>
             <a:endParaRPr lang="en-US"/>
           </a:p>
@@ -819,7 +819,7 @@
           <a:p>
             <a:fld id="{5B4E9A02-2862-4C46-BDE8-5458F4D04D4E}" type="datetimeFigureOut">
               <a:rPr lang="en-US" smtClean="0"/>
-              <a:t>2/17/16</a:t>
+              <a:t>2/19/16</a:t>
             </a:fld>
             <a:endParaRPr lang="en-US"/>
           </a:p>
@@ -1060,7 +1060,7 @@
           <a:p>
             <a:fld id="{5B4E9A02-2862-4C46-BDE8-5458F4D04D4E}" type="datetimeFigureOut">
               <a:rPr lang="en-US" smtClean="0"/>
-              <a:t>2/17/16</a:t>
+              <a:t>2/19/16</a:t>
             </a:fld>
             <a:endParaRPr lang="en-US"/>
           </a:p>
@@ -1343,7 +1343,7 @@
           <a:p>
             <a:fld id="{5B4E9A02-2862-4C46-BDE8-5458F4D04D4E}" type="datetimeFigureOut">
               <a:rPr lang="en-US" smtClean="0"/>
-              <a:t>2/17/16</a:t>
+              <a:t>2/19/16</a:t>
             </a:fld>
             <a:endParaRPr lang="en-US"/>
           </a:p>
@@ -1772,7 +1772,7 @@
           <a:p>
             <a:fld id="{5B4E9A02-2862-4C46-BDE8-5458F4D04D4E}" type="datetimeFigureOut">
               <a:rPr lang="en-US" smtClean="0"/>
-              <a:t>2/17/16</a:t>
+              <a:t>2/19/16</a:t>
             </a:fld>
             <a:endParaRPr lang="en-US"/>
           </a:p>
@@ -1885,7 +1885,7 @@
           <a:p>
             <a:fld id="{5B4E9A02-2862-4C46-BDE8-5458F4D04D4E}" type="datetimeFigureOut">
               <a:rPr lang="en-US" smtClean="0"/>
-              <a:t>2/17/16</a:t>
+              <a:t>2/19/16</a:t>
             </a:fld>
             <a:endParaRPr lang="en-US"/>
           </a:p>
@@ -1975,7 +1975,7 @@
           <a:p>
             <a:fld id="{5B4E9A02-2862-4C46-BDE8-5458F4D04D4E}" type="datetimeFigureOut">
               <a:rPr lang="en-US" smtClean="0"/>
-              <a:t>2/17/16</a:t>
+              <a:t>2/19/16</a:t>
             </a:fld>
             <a:endParaRPr lang="en-US"/>
           </a:p>
@@ -2164,7 +2164,7 @@
           <a:p>
             <a:fld id="{5B4E9A02-2862-4C46-BDE8-5458F4D04D4E}" type="datetimeFigureOut">
               <a:rPr lang="en-US" smtClean="0"/>
-              <a:t>2/17/16</a:t>
+              <a:t>2/19/16</a:t>
             </a:fld>
             <a:endParaRPr lang="en-US"/>
           </a:p>
@@ -2482,7 +2482,7 @@
           <a:p>
             <a:fld id="{5B4E9A02-2862-4C46-BDE8-5458F4D04D4E}" type="datetimeFigureOut">
               <a:rPr lang="en-US" smtClean="0"/>
-              <a:t>2/17/16</a:t>
+              <a:t>2/19/16</a:t>
             </a:fld>
             <a:endParaRPr lang="en-US"/>
           </a:p>
@@ -2861,7 +2861,7 @@
           <a:p>
             <a:fld id="{5B4E9A02-2862-4C46-BDE8-5458F4D04D4E}" type="datetimeFigureOut">
               <a:rPr lang="en-US" smtClean="0"/>
-              <a:t>2/17/16</a:t>
+              <a:t>2/19/16</a:t>
             </a:fld>
             <a:endParaRPr lang="en-US"/>
           </a:p>
@@ -3209,15 +3209,31 @@
               <a:rPr lang="en-US" dirty="0" smtClean="0"/>
             </a:br>
             <a:r>
+              <a:rPr lang="en-US" smtClean="0"/>
+              <a:t>Lesson </a:t>
+            </a:r>
+            <a:r>
+              <a:rPr lang="en-US" smtClean="0"/>
+              <a:t>7 </a:t>
+            </a:r>
+            <a:r>
               <a:rPr lang="en-US" dirty="0" smtClean="0"/>
-              <a:t>Lesson 6 </a:t>
+              <a:t/>
             </a:r>
             <a:br>
               <a:rPr lang="en-US" dirty="0" smtClean="0"/>
             </a:br>
             <a:r>
+              <a:rPr lang="en-US" smtClean="0"/>
+              <a:t>Feb </a:t>
+            </a:r>
+            <a:r>
+              <a:rPr lang="en-US" smtClean="0"/>
+              <a:t>17, </a:t>
+            </a:r>
+            <a:r>
               <a:rPr lang="en-US" dirty="0" smtClean="0"/>
-              <a:t>Feb 10, 2016</a:t>
+              <a:t>2016</a:t>
             </a:r>
             <a:endParaRPr lang="en-US" dirty="0"/>
           </a:p>

</xml_diff>